<commit_message>
Update Buffer Tree - Poster Presentation.pptx
</commit_message>
<xml_diff>
--- a/Buffer Tree - Poster Presentation.pptx
+++ b/Buffer Tree - Poster Presentation.pptx
@@ -3468,7 +3468,7 @@
         <p:spPr>
           <a:xfrm>
             <a:off x="270769" y="1429872"/>
-            <a:ext cx="7688062" cy="1335687"/>
+            <a:ext cx="7688062" cy="1516249"/>
           </a:xfrm>
           <a:prstGeom prst="rect">
             <a:avLst/>
@@ -3481,7 +3481,7 @@
           </a:bodyPr>
           <a:lstStyle/>
           <a:p>
-            <a:pPr>
+            <a:pPr algn="just">
               <a:lnSpc>
                 <a:spcPct val="120000"/>
               </a:lnSpc>
@@ -3491,88 +3491,29 @@
                 <a:latin typeface="Arial" panose="020B0604020202020204" pitchFamily="34" charset="0"/>
                 <a:cs typeface="Arial" panose="020B0604020202020204" pitchFamily="34" charset="0"/>
               </a:rPr>
-              <a:t>Muhammad Sabihul Hasan</a:t>
-            </a:r>
-            <a:r>
-              <a:rPr lang="en-US" sz="1600" i="1" baseline="30000" dirty="0">
-                <a:latin typeface="Arial" panose="020B0604020202020204" pitchFamily="34" charset="0"/>
-                <a:cs typeface="Arial" panose="020B0604020202020204" pitchFamily="34" charset="0"/>
-              </a:rPr>
-              <a:t>1</a:t>
-            </a:r>
+              <a:t>Muhammad Sabihul Hasan, Agha Syed Nasir Mahmood Azeemi,</a:t>
+            </a:r>
+          </a:p>
+          <a:p>
+            <a:pPr algn="just">
+              <a:lnSpc>
+                <a:spcPct val="120000"/>
+              </a:lnSpc>
+            </a:pPr>
             <a:r>
               <a:rPr lang="en-US" sz="1500" i="1" dirty="0">
                 <a:latin typeface="Arial" panose="020B0604020202020204" pitchFamily="34" charset="0"/>
                 <a:cs typeface="Arial" panose="020B0604020202020204" pitchFamily="34" charset="0"/>
               </a:rPr>
-              <a:t>, Agha Syed Nasir Mahmood Azeemi</a:t>
-            </a:r>
-            <a:r>
-              <a:rPr lang="en-US" sz="1600" i="1" baseline="30000" dirty="0">
-                <a:latin typeface="Arial" panose="020B0604020202020204" pitchFamily="34" charset="0"/>
-                <a:cs typeface="Arial" panose="020B0604020202020204" pitchFamily="34" charset="0"/>
-              </a:rPr>
-              <a:t>2</a:t>
-            </a:r>
-            <a:r>
-              <a:rPr lang="en-US" sz="1500" i="1" dirty="0">
-                <a:latin typeface="Arial" panose="020B0604020202020204" pitchFamily="34" charset="0"/>
-                <a:cs typeface="Arial" panose="020B0604020202020204" pitchFamily="34" charset="0"/>
-              </a:rPr>
-              <a:t>,</a:t>
-            </a:r>
-          </a:p>
-          <a:p>
-            <a:pPr>
-              <a:lnSpc>
-                <a:spcPct val="120000"/>
-              </a:lnSpc>
-            </a:pPr>
-            <a:r>
-              <a:rPr lang="en-US" sz="1500" i="1" dirty="0">
-                <a:latin typeface="Arial" panose="020B0604020202020204" pitchFamily="34" charset="0"/>
-                <a:cs typeface="Arial" panose="020B0604020202020204" pitchFamily="34" charset="0"/>
-              </a:rPr>
-              <a:t>Salman Muhammad Younus</a:t>
-            </a:r>
-            <a:r>
-              <a:rPr lang="en-US" sz="1600" i="1" baseline="30000" dirty="0">
-                <a:latin typeface="Arial" panose="020B0604020202020204" pitchFamily="34" charset="0"/>
-                <a:cs typeface="Arial" panose="020B0604020202020204" pitchFamily="34" charset="0"/>
-              </a:rPr>
-              <a:t>3</a:t>
-            </a:r>
-            <a:r>
-              <a:rPr lang="en-US" sz="1500" i="1" dirty="0">
-                <a:latin typeface="Arial" panose="020B0604020202020204" pitchFamily="34" charset="0"/>
-                <a:cs typeface="Arial" panose="020B0604020202020204" pitchFamily="34" charset="0"/>
-              </a:rPr>
-              <a:t>, Syed Hammad Ali</a:t>
-            </a:r>
-            <a:r>
-              <a:rPr lang="en-US" sz="1600" i="1" baseline="30000" dirty="0">
-                <a:latin typeface="Arial" panose="020B0604020202020204" pitchFamily="34" charset="0"/>
-                <a:cs typeface="Arial" panose="020B0604020202020204" pitchFamily="34" charset="0"/>
-              </a:rPr>
-              <a:t>4</a:t>
-            </a:r>
-            <a:r>
-              <a:rPr lang="en-US" sz="1500" i="1" dirty="0">
-                <a:latin typeface="Arial" panose="020B0604020202020204" pitchFamily="34" charset="0"/>
-                <a:cs typeface="Arial" panose="020B0604020202020204" pitchFamily="34" charset="0"/>
-              </a:rPr>
-              <a:t>, Muhammad Faraz Ozair</a:t>
-            </a:r>
-            <a:r>
-              <a:rPr lang="en-US" sz="1600" i="1" baseline="30000" dirty="0">
-                <a:latin typeface="Arial" panose="020B0604020202020204" pitchFamily="34" charset="0"/>
-                <a:cs typeface="Arial" panose="020B0604020202020204" pitchFamily="34" charset="0"/>
-              </a:rPr>
-              <a:t>5</a:t>
-            </a:r>
-          </a:p>
-          <a:p>
-            <a:pPr>
+              <a:t>Salman Muhammad Younus, Syed Hammad Ali, Muhammad Faraz Ozair</a:t>
+            </a:r>
+            <a:endParaRPr lang="en-US" sz="1600" i="1" baseline="30000" dirty="0">
+              <a:latin typeface="Arial" panose="020B0604020202020204" pitchFamily="34" charset="0"/>
+              <a:cs typeface="Arial" panose="020B0604020202020204" pitchFamily="34" charset="0"/>
+            </a:endParaRPr>
+          </a:p>
+          <a:p>
+            <a:pPr algn="just">
               <a:lnSpc>
                 <a:spcPct val="120000"/>
               </a:lnSpc>
@@ -3583,16 +3524,31 @@
             </a:endParaRPr>
           </a:p>
           <a:p>
-            <a:pPr>
+            <a:pPr lvl="0" algn="just">
               <a:lnSpc>
                 <a:spcPct val="120000"/>
               </a:lnSpc>
-              <a:spcBef>
-                <a:spcPts val="600"/>
-              </a:spcBef>
-              <a:spcAft>
-                <a:spcPts val="600"/>
-              </a:spcAft>
+            </a:pPr>
+            <a:r>
+              <a:rPr lang="en-US" sz="2000" baseline="30000" dirty="0">
+                <a:solidFill>
+                  <a:prstClr val="black"/>
+                </a:solidFill>
+                <a:latin typeface="Arial" panose="020B0604020202020204" pitchFamily="34" charset="0"/>
+                <a:cs typeface="Arial" panose="020B0604020202020204" pitchFamily="34" charset="0"/>
+              </a:rPr>
+              <a:t>Department of Computer Science,</a:t>
+            </a:r>
+            <a:endParaRPr lang="en-US" sz="1500" i="1" dirty="0">
+              <a:latin typeface="Arial" panose="020B0604020202020204" pitchFamily="34" charset="0"/>
+              <a:cs typeface="Arial" panose="020B0604020202020204" pitchFamily="34" charset="0"/>
+            </a:endParaRPr>
+          </a:p>
+          <a:p>
+            <a:pPr algn="just">
+              <a:lnSpc>
+                <a:spcPct val="120000"/>
+              </a:lnSpc>
             </a:pPr>
             <a:r>
               <a:rPr lang="en-US" sz="2000" baseline="30000" dirty="0">
@@ -3601,10 +3557,6 @@
               </a:rPr>
               <a:t>Habib University</a:t>
             </a:r>
-            <a:endParaRPr lang="en-US" sz="2000" dirty="0">
-              <a:latin typeface="Arial" panose="020B0604020202020204" pitchFamily="34" charset="0"/>
-              <a:cs typeface="Arial" panose="020B0604020202020204" pitchFamily="34" charset="0"/>
-            </a:endParaRPr>
           </a:p>
         </p:txBody>
       </p:sp>
@@ -3757,7 +3709,7 @@
                 <a:latin typeface="Arial" panose="020B0604020202020204" pitchFamily="34" charset="0"/>
                 <a:cs typeface="Arial" panose="020B0604020202020204" pitchFamily="34" charset="0"/>
               </a:rPr>
-              <a:t>Previous work, challenge, and approach</a:t>
+              <a:t>Approach and </a:t>
             </a:r>
           </a:p>
         </p:txBody>
@@ -3777,7 +3729,7 @@
         <p:spPr>
           <a:xfrm>
             <a:off x="248575" y="787828"/>
-            <a:ext cx="4058882" cy="1384995"/>
+            <a:ext cx="4058882" cy="958980"/>
           </a:xfrm>
           <a:prstGeom prst="rect">
             <a:avLst/>
@@ -3790,49 +3742,42 @@
           </a:bodyPr>
           <a:lstStyle/>
           <a:p>
-            <a:r>
-              <a:rPr lang="en-US" sz="1400" dirty="0"/>
-              <a:t>Possible contents for slide</a:t>
-            </a:r>
-          </a:p>
-          <a:p>
             <a:pPr marL="285750" indent="-285750">
-              <a:buFont typeface="Arial" panose="020B0604020202020204" pitchFamily="34" charset="0"/>
-              <a:buChar char="•"/>
+              <a:lnSpc>
+                <a:spcPct val="120000"/>
+              </a:lnSpc>
+              <a:buFont typeface="Courier New" panose="02070309020205020404" pitchFamily="49" charset="0"/>
+              <a:buChar char="o"/>
             </a:pPr>
             <a:r>
-              <a:rPr lang="en-US" sz="1400" dirty="0"/>
-              <a:t>Clearly identify the challenge you are solving</a:t>
-            </a:r>
-          </a:p>
-          <a:p>
-            <a:pPr marL="651510" lvl="1" indent="-285750">
-              <a:buFont typeface="Arial" panose="020B0604020202020204" pitchFamily="34" charset="0"/>
-              <a:buChar char="•"/>
+              <a:rPr lang="en-US" sz="1600" dirty="0"/>
+              <a:t>Internal memory</a:t>
+            </a:r>
+          </a:p>
+          <a:p>
+            <a:pPr marL="285750" indent="-285750">
+              <a:lnSpc>
+                <a:spcPct val="120000"/>
+              </a:lnSpc>
+              <a:buFont typeface="Courier New" panose="02070309020205020404" pitchFamily="49" charset="0"/>
+              <a:buChar char="o"/>
             </a:pPr>
             <a:r>
-              <a:rPr lang="en-US" sz="1400" dirty="0"/>
-              <a:t>Explain previous work (put your research in context)</a:t>
-            </a:r>
-          </a:p>
-          <a:p>
-            <a:pPr marL="651510" lvl="1" indent="-285750">
-              <a:buFont typeface="Arial" panose="020B0604020202020204" pitchFamily="34" charset="0"/>
-              <a:buChar char="•"/>
+              <a:rPr lang="en-US" sz="1600" dirty="0"/>
+              <a:t>External memory</a:t>
+            </a:r>
+          </a:p>
+          <a:p>
+            <a:pPr marL="285750" indent="-285750">
+              <a:lnSpc>
+                <a:spcPct val="120000"/>
+              </a:lnSpc>
+              <a:buFont typeface="Courier New" panose="02070309020205020404" pitchFamily="49" charset="0"/>
+              <a:buChar char="o"/>
             </a:pPr>
             <a:r>
-              <a:rPr lang="en-US" sz="1400" dirty="0"/>
-              <a:t>Fundamental information or terms needed</a:t>
-            </a:r>
-          </a:p>
-          <a:p>
-            <a:pPr marL="285750" indent="-285750">
-              <a:buFont typeface="Arial" panose="020B0604020202020204" pitchFamily="34" charset="0"/>
-              <a:buChar char="•"/>
-            </a:pPr>
-            <a:r>
-              <a:rPr lang="en-US" sz="1400" dirty="0"/>
-              <a:t>Your strategy for overcoming the challenge</a:t>
+              <a:rPr lang="en-US" sz="1600" dirty="0"/>
+              <a:t>Buffers</a:t>
             </a:r>
           </a:p>
         </p:txBody>
@@ -4046,7 +3991,7 @@
         <p:spPr>
           <a:xfrm>
             <a:off x="326213" y="800252"/>
-            <a:ext cx="7688062" cy="2726900"/>
+            <a:ext cx="7688062" cy="1409617"/>
           </a:xfrm>
           <a:prstGeom prst="rect">
             <a:avLst/>
@@ -4059,13 +4004,14 @@
           </a:bodyPr>
           <a:lstStyle/>
           <a:p>
-            <a:r>
-              <a:rPr lang="en-US" sz="1400" dirty="0"/>
+            <a:pPr algn="just"/>
+            <a:r>
+              <a:rPr lang="en-US" sz="1400" b="1" dirty="0"/>
               <a:t>Operations:</a:t>
             </a:r>
           </a:p>
           <a:p>
-            <a:pPr marL="285750" indent="-285750">
+            <a:pPr marL="285750" indent="-285750" algn="just">
               <a:buFont typeface="Courier New" panose="02070309020205020404" pitchFamily="49" charset="0"/>
               <a:buChar char="o"/>
             </a:pPr>
@@ -4091,7 +4037,7 @@
             </a:r>
           </a:p>
           <a:p>
-            <a:pPr marL="285750" indent="-285750">
+            <a:pPr marL="285750" indent="-285750" algn="just">
               <a:buFont typeface="Courier New" panose="02070309020205020404" pitchFamily="49" charset="0"/>
               <a:buChar char="o"/>
             </a:pPr>
@@ -4113,7 +4059,7 @@
             </a:r>
           </a:p>
           <a:p>
-            <a:pPr marL="285750" indent="-285750">
+            <a:pPr marL="285750" indent="-285750" algn="just">
               <a:buFont typeface="Courier New" panose="02070309020205020404" pitchFamily="49" charset="0"/>
               <a:buChar char="o"/>
             </a:pPr>
@@ -4123,7 +4069,7 @@
             </a:r>
           </a:p>
           <a:p>
-            <a:pPr marL="285750" indent="-285750">
+            <a:pPr marL="285750" indent="-285750" algn="just">
               <a:buFont typeface="Courier New" panose="02070309020205020404" pitchFamily="49" charset="0"/>
               <a:buChar char="o"/>
             </a:pPr>
@@ -4145,7 +4091,7 @@
             </a:r>
           </a:p>
           <a:p>
-            <a:pPr marL="285750" indent="-285750">
+            <a:pPr marL="285750" indent="-285750" algn="just">
               <a:buFont typeface="Courier New" panose="02070309020205020404" pitchFamily="49" charset="0"/>
               <a:buChar char="o"/>
             </a:pPr>
@@ -4165,43 +4111,6 @@
               <a:rPr lang="en-US" dirty="0"/>
               <a:t>)</a:t>
             </a:r>
-          </a:p>
-          <a:p>
-            <a:pPr marL="285750" indent="-285750">
-              <a:buFont typeface="Courier New" panose="02070309020205020404" pitchFamily="49" charset="0"/>
-              <a:buChar char="o"/>
-            </a:pPr>
-            <a:endParaRPr lang="en-US" dirty="0"/>
-          </a:p>
-          <a:p>
-            <a:r>
-              <a:rPr lang="en-US" dirty="0"/>
-              <a:t>Time Complexity</a:t>
-            </a:r>
-          </a:p>
-          <a:p>
-            <a:endParaRPr lang="en-US" dirty="0"/>
-          </a:p>
-          <a:p>
-            <a:pPr marL="285750" indent="-285750">
-              <a:buFont typeface="Arial" panose="020B0604020202020204" pitchFamily="34" charset="0"/>
-              <a:buChar char="•"/>
-            </a:pPr>
-            <a:endParaRPr lang="en-US" dirty="0"/>
-          </a:p>
-          <a:p>
-            <a:pPr marL="285750" indent="-285750">
-              <a:buFont typeface="Arial" panose="020B0604020202020204" pitchFamily="34" charset="0"/>
-              <a:buChar char="•"/>
-            </a:pPr>
-            <a:endParaRPr lang="en-US" sz="1400" dirty="0"/>
-          </a:p>
-          <a:p>
-            <a:pPr marL="285750" indent="-285750">
-              <a:buFont typeface="Arial" panose="020B0604020202020204" pitchFamily="34" charset="0"/>
-              <a:buChar char="•"/>
-            </a:pPr>
-            <a:endParaRPr lang="en-US" sz="1400" dirty="0"/>
           </a:p>
         </p:txBody>
       </p:sp>

</xml_diff>